<commit_message>
Enable zipkin tracing for java
</commit_message>
<xml_diff>
--- a/Polyglot Microservices.pptx
+++ b/Polyglot Microservices.pptx
@@ -2998,7 +2998,15 @@
           <a:p>
             <a:r>
               <a:rPr lang="en-US" dirty="0" smtClean="0"/>
-              <a:t>Polyglot MicroServices/APIs with modern RPCs</a:t>
+              <a:t>Polyglot </a:t>
+            </a:r>
+            <a:r>
+              <a:rPr lang="en-US" dirty="0" err="1" smtClean="0"/>
+              <a:t>MicroServices</a:t>
+            </a:r>
+            <a:r>
+              <a:rPr lang="en-US" dirty="0" smtClean="0"/>
+              <a:t>/APIs with modern RPCs</a:t>
             </a:r>
             <a:endParaRPr lang="en-US" dirty="0"/>
           </a:p>
@@ -4937,7 +4945,6 @@
               <a:rPr lang="en-US" sz="1200" dirty="0" smtClean="0"/>
               <a:t>Note</a:t>
             </a:r>
-            <a:endParaRPr lang="en-US" sz="1200" dirty="0" smtClean="0"/>
           </a:p>
           <a:p>
             <a:pPr algn="ctr"/>
@@ -5255,11 +5262,7 @@
             <a:pPr algn="ctr"/>
             <a:r>
               <a:rPr lang="en-US" sz="1200" dirty="0" smtClean="0"/>
-              <a:t>API </a:t>
-            </a:r>
-            <a:r>
-              <a:rPr lang="en-US" sz="1200" dirty="0" smtClean="0"/>
-              <a:t>Clients</a:t>
+              <a:t>API Clients</a:t>
             </a:r>
           </a:p>
           <a:p>
@@ -5346,7 +5349,6 @@
               <a:rPr lang="en-US" sz="1200" dirty="0" smtClean="0"/>
               <a:t>Java Client</a:t>
             </a:r>
-            <a:endParaRPr lang="en-US" sz="1200" dirty="0" smtClean="0"/>
           </a:p>
           <a:p>
             <a:pPr algn="ctr"/>
@@ -5559,8 +5561,13 @@
             <a:pPr lvl="1"/>
             <a:r>
               <a:rPr lang="en-US" dirty="0" smtClean="0"/>
-              <a:t>Agree on the RPC framework for microservices</a:t>
-            </a:r>
+              <a:t>Agree on the RPC framework for </a:t>
+            </a:r>
+            <a:r>
+              <a:rPr lang="en-US" dirty="0" err="1" smtClean="0"/>
+              <a:t>microservices</a:t>
+            </a:r>
+            <a:endParaRPr lang="en-US" dirty="0" smtClean="0"/>
           </a:p>
           <a:p>
             <a:pPr lvl="1"/>
@@ -5580,8 +5587,13 @@
             <a:pPr lvl="1"/>
             <a:r>
               <a:rPr lang="en-US" dirty="0" smtClean="0"/>
-              <a:t>Fully implement a sample scenario consisting of polyglot microservices</a:t>
-            </a:r>
+              <a:t>Fully implement a sample scenario consisting of polyglot </a:t>
+            </a:r>
+            <a:r>
+              <a:rPr lang="en-US" dirty="0" err="1" smtClean="0"/>
+              <a:t>microservices</a:t>
+            </a:r>
+            <a:endParaRPr lang="en-US" dirty="0" smtClean="0"/>
           </a:p>
           <a:p>
             <a:pPr lvl="1"/>
@@ -5798,7 +5810,7 @@
         </p:nvSpPr>
         <p:spPr>
           <a:xfrm>
-            <a:off x="1844746" y="2058188"/>
+            <a:off x="1026047" y="2058188"/>
             <a:ext cx="4657060" cy="3545170"/>
           </a:xfrm>
           <a:prstGeom prst="roundRect">
@@ -5842,7 +5854,7 @@
         </p:nvSpPr>
         <p:spPr>
           <a:xfrm>
-            <a:off x="6602819" y="1690688"/>
+            <a:off x="5784120" y="1690688"/>
             <a:ext cx="4657060" cy="4975926"/>
           </a:xfrm>
           <a:prstGeom prst="roundRect">
@@ -5908,7 +5920,7 @@
         </p:nvSpPr>
         <p:spPr>
           <a:xfrm>
-            <a:off x="6267893" y="2071010"/>
+            <a:off x="5449194" y="2071010"/>
             <a:ext cx="1265275" cy="673930"/>
           </a:xfrm>
           <a:prstGeom prst="roundRect">
@@ -5957,7 +5969,7 @@
         </p:nvSpPr>
         <p:spPr>
           <a:xfrm>
-            <a:off x="6262576" y="3306839"/>
+            <a:off x="5443877" y="3306839"/>
             <a:ext cx="1265275" cy="683310"/>
           </a:xfrm>
           <a:prstGeom prst="roundRect">
@@ -6006,7 +6018,7 @@
         </p:nvSpPr>
         <p:spPr>
           <a:xfrm>
-            <a:off x="6267893" y="4518753"/>
+            <a:off x="5449194" y="4518753"/>
             <a:ext cx="1265275" cy="663575"/>
           </a:xfrm>
           <a:prstGeom prst="roundRect">
@@ -6055,7 +6067,7 @@
         </p:nvSpPr>
         <p:spPr>
           <a:xfrm>
-            <a:off x="8447565" y="2661958"/>
+            <a:off x="7628866" y="2661958"/>
             <a:ext cx="1265275" cy="657481"/>
           </a:xfrm>
           <a:prstGeom prst="roundRect">
@@ -6104,7 +6116,7 @@
         </p:nvSpPr>
         <p:spPr>
           <a:xfrm>
-            <a:off x="3416602" y="3078181"/>
+            <a:off x="2597903" y="3078181"/>
             <a:ext cx="1265275" cy="839972"/>
           </a:xfrm>
           <a:prstGeom prst="roundRect">
@@ -6149,7 +6161,7 @@
         </p:nvCxnSpPr>
         <p:spPr>
           <a:xfrm>
-            <a:off x="4377959" y="3274236"/>
+            <a:off x="3559260" y="3274236"/>
             <a:ext cx="1884617" cy="374258"/>
           </a:xfrm>
           <a:prstGeom prst="bentConnector3">
@@ -6179,7 +6191,7 @@
         </p:nvSpPr>
         <p:spPr>
           <a:xfrm>
-            <a:off x="8463518" y="3496811"/>
+            <a:off x="7644819" y="3496811"/>
             <a:ext cx="1265275" cy="631931"/>
           </a:xfrm>
           <a:prstGeom prst="roundRect">
@@ -6228,7 +6240,7 @@
         </p:nvSpPr>
         <p:spPr>
           <a:xfrm>
-            <a:off x="8463518" y="4354716"/>
+            <a:off x="7644819" y="4354716"/>
             <a:ext cx="1265275" cy="695359"/>
           </a:xfrm>
           <a:prstGeom prst="roundRect">
@@ -6280,7 +6292,7 @@
         </p:nvCxnSpPr>
         <p:spPr>
           <a:xfrm>
-            <a:off x="7533168" y="2407975"/>
+            <a:off x="6714469" y="2407975"/>
             <a:ext cx="2195625" cy="2294421"/>
           </a:xfrm>
           <a:prstGeom prst="bentConnector3">
@@ -6318,7 +6330,7 @@
         </p:nvCxnSpPr>
         <p:spPr>
           <a:xfrm flipV="1">
-            <a:off x="7527851" y="2990699"/>
+            <a:off x="6709152" y="2990699"/>
             <a:ext cx="919714" cy="657795"/>
           </a:xfrm>
           <a:prstGeom prst="bentConnector3">
@@ -6356,7 +6368,7 @@
         </p:nvCxnSpPr>
         <p:spPr>
           <a:xfrm rot="5400000">
-            <a:off x="6151358" y="4106685"/>
+            <a:off x="5332659" y="4106685"/>
             <a:ext cx="860392" cy="627321"/>
           </a:xfrm>
           <a:prstGeom prst="bentConnector4">
@@ -6395,7 +6407,7 @@
         </p:nvCxnSpPr>
         <p:spPr>
           <a:xfrm>
-            <a:off x="7527851" y="3648494"/>
+            <a:off x="6709152" y="3648494"/>
             <a:ext cx="935667" cy="164283"/>
           </a:xfrm>
           <a:prstGeom prst="bentConnector3">
@@ -6433,7 +6445,7 @@
         </p:nvCxnSpPr>
         <p:spPr>
           <a:xfrm rot="5400000" flipH="1" flipV="1">
-            <a:off x="6616923" y="3023232"/>
+            <a:off x="5798224" y="3023232"/>
             <a:ext cx="561899" cy="5317"/>
           </a:xfrm>
           <a:prstGeom prst="bentConnector3">
@@ -6466,7 +6478,7 @@
         </p:nvGrpSpPr>
         <p:grpSpPr>
           <a:xfrm>
-            <a:off x="7054702" y="5363506"/>
+            <a:off x="6236003" y="5363506"/>
             <a:ext cx="3753293" cy="1129598"/>
             <a:chOff x="4518837" y="5752326"/>
             <a:chExt cx="3753293" cy="1129598"/>
@@ -6729,7 +6741,7 @@
         </p:nvSpPr>
         <p:spPr>
           <a:xfrm>
-            <a:off x="1309581" y="3203114"/>
+            <a:off x="490882" y="3203114"/>
             <a:ext cx="1265275" cy="587393"/>
           </a:xfrm>
           <a:prstGeom prst="roundRect">
@@ -6774,7 +6786,7 @@
         </p:nvCxnSpPr>
         <p:spPr>
           <a:xfrm>
-            <a:off x="2574856" y="3496811"/>
+            <a:off x="1756157" y="3496811"/>
             <a:ext cx="841746" cy="1356"/>
           </a:xfrm>
           <a:prstGeom prst="bentConnector3">
@@ -6807,7 +6819,7 @@
         </p:nvSpPr>
         <p:spPr>
           <a:xfrm>
-            <a:off x="1461981" y="3355514"/>
+            <a:off x="643282" y="3355514"/>
             <a:ext cx="1265275" cy="587393"/>
           </a:xfrm>
           <a:prstGeom prst="roundRect">
@@ -6852,7 +6864,7 @@
         </p:nvCxnSpPr>
         <p:spPr>
           <a:xfrm flipV="1">
-            <a:off x="4377959" y="2407975"/>
+            <a:off x="3559260" y="2407975"/>
             <a:ext cx="1889934" cy="866261"/>
           </a:xfrm>
           <a:prstGeom prst="bentConnector3">
@@ -6882,7 +6894,7 @@
         </p:nvGrpSpPr>
         <p:grpSpPr>
           <a:xfrm>
-            <a:off x="3708105" y="3161840"/>
+            <a:off x="2889406" y="3161840"/>
             <a:ext cx="669854" cy="219542"/>
             <a:chOff x="3703676" y="2990699"/>
             <a:chExt cx="669854" cy="307024"/>
@@ -7014,7 +7026,7 @@
         </p:nvCxnSpPr>
         <p:spPr>
           <a:xfrm rot="5400000" flipH="1" flipV="1">
-            <a:off x="6310569" y="392206"/>
+            <a:off x="5491870" y="392206"/>
             <a:ext cx="499882" cy="5039386"/>
           </a:xfrm>
           <a:prstGeom prst="bentConnector3">
@@ -7041,6 +7053,112 @@
           </a:fontRef>
         </p:style>
       </p:cxnSp>
+      <p:sp>
+        <p:nvSpPr>
+          <p:cNvPr id="35" name="Rounded Rectangle 34"/>
+          <p:cNvSpPr/>
+          <p:nvPr/>
+        </p:nvSpPr>
+        <p:spPr>
+          <a:xfrm>
+            <a:off x="9861707" y="2407975"/>
+            <a:ext cx="1887267" cy="2774354"/>
+          </a:xfrm>
+          <a:prstGeom prst="roundRect">
+            <a:avLst/>
+          </a:prstGeom>
+        </p:spPr>
+        <p:style>
+          <a:lnRef idx="1">
+            <a:schemeClr val="accent5"/>
+          </a:lnRef>
+          <a:fillRef idx="2">
+            <a:schemeClr val="accent5"/>
+          </a:fillRef>
+          <a:effectRef idx="1">
+            <a:schemeClr val="accent5"/>
+          </a:effectRef>
+          <a:fontRef idx="minor">
+            <a:schemeClr val="dk1"/>
+          </a:fontRef>
+        </p:style>
+        <p:txBody>
+          <a:bodyPr rtlCol="0" anchor="ctr"/>
+          <a:lstStyle/>
+          <a:p>
+            <a:pPr algn="ctr"/>
+            <a:r>
+              <a:rPr lang="en-US" sz="1600" dirty="0" smtClean="0"/>
+              <a:t>System of Records Tier</a:t>
+            </a:r>
+            <a:endParaRPr lang="en-US" sz="1600" dirty="0"/>
+          </a:p>
+        </p:txBody>
+      </p:sp>
+      <p:sp>
+        <p:nvSpPr>
+          <p:cNvPr id="3" name="TextBox 2"/>
+          <p:cNvSpPr txBox="1"/>
+          <p:nvPr/>
+        </p:nvSpPr>
+        <p:spPr>
+          <a:xfrm>
+            <a:off x="2862674" y="5102933"/>
+            <a:ext cx="827471" cy="338554"/>
+          </a:xfrm>
+          <a:prstGeom prst="rect">
+            <a:avLst/>
+          </a:prstGeom>
+          <a:noFill/>
+        </p:spPr>
+        <p:txBody>
+          <a:bodyPr wrap="none" rtlCol="0">
+            <a:spAutoFit/>
+          </a:bodyPr>
+          <a:lstStyle/>
+          <a:p>
+            <a:r>
+              <a:rPr lang="en-US" sz="1600" smtClean="0"/>
+              <a:t>API Tier</a:t>
+            </a:r>
+            <a:endParaRPr lang="en-US" sz="1600"/>
+          </a:p>
+        </p:txBody>
+      </p:sp>
+      <p:sp>
+        <p:nvSpPr>
+          <p:cNvPr id="37" name="TextBox 36"/>
+          <p:cNvSpPr txBox="1"/>
+          <p:nvPr/>
+        </p:nvSpPr>
+        <p:spPr>
+          <a:xfrm>
+            <a:off x="8343765" y="1760005"/>
+            <a:ext cx="1702902" cy="338554"/>
+          </a:xfrm>
+          <a:prstGeom prst="rect">
+            <a:avLst/>
+          </a:prstGeom>
+          <a:noFill/>
+        </p:spPr>
+        <p:txBody>
+          <a:bodyPr wrap="none" rtlCol="0">
+            <a:spAutoFit/>
+          </a:bodyPr>
+          <a:lstStyle/>
+          <a:p>
+            <a:r>
+              <a:rPr lang="en-US" sz="1600" smtClean="0"/>
+              <a:t>Microservices</a:t>
+            </a:r>
+            <a:r>
+              <a:rPr lang="en-US" sz="1600" dirty="0" smtClean="0"/>
+              <a:t> Tier</a:t>
+            </a:r>
+            <a:endParaRPr lang="en-US" sz="1600" dirty="0"/>
+          </a:p>
+        </p:txBody>
+      </p:sp>
     </p:spTree>
     <p:extLst>
       <p:ext uri="{BB962C8B-B14F-4D97-AF65-F5344CB8AC3E}">
@@ -7091,11 +7209,11 @@
               <a:t>APIs vs </a:t>
             </a:r>
             <a:r>
-              <a:rPr lang="en-US" dirty="0"/>
+              <a:rPr lang="en-US" dirty="0" err="1"/>
               <a:t>m</a:t>
             </a:r>
             <a:r>
-              <a:rPr lang="en-US" dirty="0" smtClean="0"/>
+              <a:rPr lang="en-US" dirty="0" err="1" smtClean="0"/>
               <a:t>icroservices</a:t>
             </a:r>
             <a:endParaRPr lang="en-US" dirty="0"/>
@@ -7124,19 +7242,28 @@
               <a:t>APIs and </a:t>
             </a:r>
             <a:r>
-              <a:rPr lang="en-US" dirty="0"/>
+              <a:rPr lang="en-US" dirty="0" err="1"/>
               <a:t>m</a:t>
             </a:r>
             <a:r>
+              <a:rPr lang="en-US" dirty="0" err="1" smtClean="0"/>
+              <a:t>icroservices</a:t>
+            </a:r>
+            <a:r>
               <a:rPr lang="en-US" dirty="0" smtClean="0"/>
-              <a:t>icroservices are friends</a:t>
+              <a:t> are friends</a:t>
             </a:r>
           </a:p>
           <a:p>
             <a:r>
               <a:rPr lang="en-US" dirty="0" smtClean="0"/>
-              <a:t>APIs are the faces/facades/orchestrations of microservices</a:t>
-            </a:r>
+              <a:t>APIs are the faces/facades/orchestrations of </a:t>
+            </a:r>
+            <a:r>
+              <a:rPr lang="en-US" dirty="0" err="1" smtClean="0"/>
+              <a:t>microservices</a:t>
+            </a:r>
+            <a:endParaRPr lang="en-US" dirty="0" smtClean="0"/>
           </a:p>
           <a:p>
             <a:r>
@@ -7222,7 +7349,11 @@
           <a:p>
             <a:r>
               <a:rPr lang="en-US" dirty="0" smtClean="0"/>
-              <a:t>Key features/requirements for RPC between microservices</a:t>
+              <a:t>Key features/requirements for RPC between </a:t>
+            </a:r>
+            <a:r>
+              <a:rPr lang="en-US" dirty="0" err="1" smtClean="0"/>
+              <a:t>microservices</a:t>
             </a:r>
             <a:endParaRPr lang="en-US" dirty="0"/>
           </a:p>
@@ -7668,7 +7799,15 @@
           <a:p>
             <a:r>
               <a:rPr lang="en-US" dirty="0" smtClean="0"/>
-              <a:t>Let’s assume microservices speak </a:t>
+              <a:t>Let’s assume </a:t>
+            </a:r>
+            <a:r>
+              <a:rPr lang="en-US" dirty="0" err="1" smtClean="0"/>
+              <a:t>microservices</a:t>
+            </a:r>
+            <a:r>
+              <a:rPr lang="en-US" dirty="0" smtClean="0"/>
+              <a:t> speak </a:t>
             </a:r>
             <a:r>
               <a:rPr lang="en-US" dirty="0"/>
@@ -7690,14 +7829,30 @@
             <a:pPr lvl="1"/>
             <a:r>
               <a:rPr lang="en-US" dirty="0" smtClean="0"/>
-              <a:t>I should be able to connect to other microservices, regardless of the programming language</a:t>
+              <a:t>I should be able to connect to other </a:t>
+            </a:r>
+            <a:r>
+              <a:rPr lang="en-US" dirty="0" err="1" smtClean="0"/>
+              <a:t>microservices</a:t>
+            </a:r>
+            <a:r>
+              <a:rPr lang="en-US" dirty="0" smtClean="0"/>
+              <a:t>, regardless of the programming language</a:t>
             </a:r>
           </a:p>
           <a:p>
             <a:pPr lvl="1"/>
             <a:r>
               <a:rPr lang="en-US" dirty="0" smtClean="0"/>
-              <a:t>I should be able to expose LoopBack models as a microservice so that other microservices can interact with LoopBack apps</a:t>
+              <a:t>I should be able to expose LoopBack models as a microservice so that other </a:t>
+            </a:r>
+            <a:r>
+              <a:rPr lang="en-US" dirty="0" err="1" smtClean="0"/>
+              <a:t>microservices</a:t>
+            </a:r>
+            <a:r>
+              <a:rPr lang="en-US" dirty="0" smtClean="0"/>
+              <a:t> can interact with LoopBack apps</a:t>
             </a:r>
           </a:p>
           <a:p>
@@ -8469,7 +8624,11 @@
             <a:pPr algn="ctr"/>
             <a:r>
               <a:rPr lang="en-US" sz="1200" dirty="0" smtClean="0"/>
-              <a:t>gRPC microservices</a:t>
+              <a:t>gRPC </a:t>
+            </a:r>
+            <a:r>
+              <a:rPr lang="en-US" sz="1200" dirty="0" err="1" smtClean="0"/>
+              <a:t>microservices</a:t>
             </a:r>
             <a:endParaRPr lang="en-US" sz="1200" dirty="0"/>
           </a:p>

</xml_diff>

<commit_message>
Add a microservice in Swift
</commit_message>
<xml_diff>
--- a/Polyglot Microservices.pptx
+++ b/Polyglot Microservices.pptx
@@ -11114,7 +11114,7 @@
         </p:spPr>
         <p:txBody>
           <a:bodyPr>
-            <a:normAutofit fontScale="85000" lnSpcReduction="20000"/>
+            <a:normAutofit fontScale="70000" lnSpcReduction="20000"/>
           </a:bodyPr>
           <a:lstStyle/>
           <a:p>
@@ -11169,8 +11169,39 @@
           <a:p>
             <a:r>
               <a:rPr lang="en-US" dirty="0" smtClean="0"/>
-              <a:t>Reference architectures</a:t>
-            </a:r>
+              <a:t>Reference </a:t>
+            </a:r>
+            <a:r>
+              <a:rPr lang="en-US" dirty="0" smtClean="0"/>
+              <a:t>architectures</a:t>
+            </a:r>
+          </a:p>
+          <a:p>
+            <a:pPr lvl="1"/>
+            <a:r>
+              <a:rPr lang="en-US" dirty="0" smtClean="0"/>
+              <a:t>IBM</a:t>
+            </a:r>
+          </a:p>
+          <a:p>
+            <a:pPr lvl="2"/>
+            <a:r>
+              <a:rPr lang="en-US" dirty="0">
+                <a:hlinkClick r:id="rId3"/>
+              </a:rPr>
+              <a:t>https://</a:t>
+            </a:r>
+            <a:r>
+              <a:rPr lang="en-US" dirty="0" smtClean="0">
+                <a:hlinkClick r:id="rId3"/>
+              </a:rPr>
+              <a:t>www.ibm.com/devops/method/tracks/omnichannel_track</a:t>
+            </a:r>
+            <a:r>
+              <a:rPr lang="en-US" smtClean="0"/>
+              <a:t> </a:t>
+            </a:r>
+            <a:endParaRPr lang="en-US" dirty="0" smtClean="0"/>
           </a:p>
           <a:p>
             <a:pPr lvl="1"/>
@@ -11215,34 +11246,9 @@
             <a:pPr lvl="2"/>
             <a:r>
               <a:rPr lang="en-US" dirty="0">
-                <a:hlinkClick r:id="rId3"/>
+                <a:hlinkClick r:id="rId4"/>
               </a:rPr>
               <a:t>https://eng.uber.com/tech-stack-part-one</a:t>
-            </a:r>
-            <a:r>
-              <a:rPr lang="en-US" dirty="0" smtClean="0">
-                <a:hlinkClick r:id="rId3"/>
-              </a:rPr>
-              <a:t>/</a:t>
-            </a:r>
-            <a:r>
-              <a:rPr lang="en-US" dirty="0" smtClean="0"/>
-              <a:t> </a:t>
-            </a:r>
-          </a:p>
-          <a:p>
-            <a:pPr lvl="2"/>
-            <a:r>
-              <a:rPr lang="en-US" dirty="0" smtClean="0">
-                <a:hlinkClick r:id="rId4"/>
-              </a:rPr>
-              <a:t>https</a:t>
-            </a:r>
-            <a:r>
-              <a:rPr lang="en-US" dirty="0">
-                <a:hlinkClick r:id="rId4"/>
-              </a:rPr>
-              <a:t>://eng.uber.com/soa</a:t>
             </a:r>
             <a:r>
               <a:rPr lang="en-US" dirty="0" smtClean="0">
@@ -11258,14 +11264,39 @@
           <a:p>
             <a:pPr lvl="2"/>
             <a:r>
+              <a:rPr lang="en-US" dirty="0" smtClean="0">
+                <a:hlinkClick r:id="rId5"/>
+              </a:rPr>
+              <a:t>https</a:t>
+            </a:r>
+            <a:r>
               <a:rPr lang="en-US" dirty="0">
                 <a:hlinkClick r:id="rId5"/>
               </a:rPr>
-              <a:t>https://eng.uber.com/building-tincup</a:t>
+              <a:t>://eng.uber.com/soa</a:t>
             </a:r>
             <a:r>
               <a:rPr lang="en-US" dirty="0" smtClean="0">
                 <a:hlinkClick r:id="rId5"/>
+              </a:rPr>
+              <a:t>/</a:t>
+            </a:r>
+            <a:r>
+              <a:rPr lang="en-US" dirty="0" smtClean="0"/>
+              <a:t> </a:t>
+            </a:r>
+          </a:p>
+          <a:p>
+            <a:pPr lvl="2"/>
+            <a:r>
+              <a:rPr lang="en-US" dirty="0">
+                <a:hlinkClick r:id="rId6"/>
+              </a:rPr>
+              <a:t>https://eng.uber.com/building-tincup</a:t>
+            </a:r>
+            <a:r>
+              <a:rPr lang="en-US" dirty="0" smtClean="0">
+                <a:hlinkClick r:id="rId6"/>
               </a:rPr>
               <a:t>/</a:t>
             </a:r>
@@ -11300,7 +11331,7 @@
             <p:nvPr/>
           </p:nvPicPr>
           <p:blipFill>
-            <a:blip r:embed="rId6">
+            <a:blip r:embed="rId7">
               <a:extLst>
                 <a:ext uri="{28A0092B-C50C-407E-A947-70E740481C1C}">
                   <a14:useLocalDpi xmlns:a14="http://schemas.microsoft.com/office/drawing/2010/main" val="0"/>

</xml_diff>